<commit_message>
Implemented a project with multiple cases for the presentation next to the selenium project and changed the presentation
</commit_message>
<xml_diff>
--- a/Presentatie.pptx
+++ b/Presentatie.pptx
@@ -6,10 +6,17 @@
   </p:sldMasterIdLst>
   <p:sldIdLst>
     <p:sldId id="256" r:id="rId2"/>
-    <p:sldId id="260" r:id="rId3"/>
-    <p:sldId id="258" r:id="rId4"/>
-    <p:sldId id="259" r:id="rId5"/>
-    <p:sldId id="257" r:id="rId6"/>
+    <p:sldId id="261" r:id="rId3"/>
+    <p:sldId id="266" r:id="rId4"/>
+    <p:sldId id="267" r:id="rId5"/>
+    <p:sldId id="260" r:id="rId6"/>
+    <p:sldId id="258" r:id="rId7"/>
+    <p:sldId id="259" r:id="rId8"/>
+    <p:sldId id="257" r:id="rId9"/>
+    <p:sldId id="262" r:id="rId10"/>
+    <p:sldId id="264" r:id="rId11"/>
+    <p:sldId id="265" r:id="rId12"/>
+    <p:sldId id="263" r:id="rId13"/>
   </p:sldIdLst>
   <p:sldSz cx="12192000" cy="6858000"/>
   <p:notesSz cx="6858000" cy="9144000"/>
@@ -108,6 +115,11 @@
       </a:defRPr>
     </a:lvl9pPr>
   </p:defaultTextStyle>
+  <p:extLst>
+    <p:ext uri="{EFAFB233-063F-42B5-8137-9DF3F51BA10A}">
+      <p15:sldGuideLst xmlns:p15="http://schemas.microsoft.com/office/powerpoint/2012/main"/>
+    </p:ext>
+  </p:extLst>
 </p:presentation>
 </file>
 
@@ -246,7 +258,7 @@
           <a:p>
             <a:fld id="{D8CD0494-F96A-4062-BBA3-9C20345F7331}" type="datetimeFigureOut">
               <a:rPr lang="en-GB" smtClean="0"/>
-              <a:t>30/04/2017</a:t>
+              <a:t>01/05/2017</a:t>
             </a:fld>
             <a:endParaRPr lang="en-GB"/>
           </a:p>
@@ -288,7 +300,7 @@
           <a:p>
             <a:fld id="{96259E1A-2B77-495C-A47C-130D6931EF05}" type="slidenum">
               <a:rPr lang="en-GB" smtClean="0"/>
-              <a:t>‹#›</a:t>
+              <a:t>‹nr.›</a:t>
             </a:fld>
             <a:endParaRPr lang="en-GB"/>
           </a:p>
@@ -416,7 +428,7 @@
           <a:p>
             <a:fld id="{D8CD0494-F96A-4062-BBA3-9C20345F7331}" type="datetimeFigureOut">
               <a:rPr lang="en-GB" smtClean="0"/>
-              <a:t>30/04/2017</a:t>
+              <a:t>01/05/2017</a:t>
             </a:fld>
             <a:endParaRPr lang="en-GB"/>
           </a:p>
@@ -458,7 +470,7 @@
           <a:p>
             <a:fld id="{96259E1A-2B77-495C-A47C-130D6931EF05}" type="slidenum">
               <a:rPr lang="en-GB" smtClean="0"/>
-              <a:t>‹#›</a:t>
+              <a:t>‹nr.›</a:t>
             </a:fld>
             <a:endParaRPr lang="en-GB"/>
           </a:p>
@@ -596,7 +608,7 @@
           <a:p>
             <a:fld id="{D8CD0494-F96A-4062-BBA3-9C20345F7331}" type="datetimeFigureOut">
               <a:rPr lang="en-GB" smtClean="0"/>
-              <a:t>30/04/2017</a:t>
+              <a:t>01/05/2017</a:t>
             </a:fld>
             <a:endParaRPr lang="en-GB"/>
           </a:p>
@@ -638,7 +650,7 @@
           <a:p>
             <a:fld id="{96259E1A-2B77-495C-A47C-130D6931EF05}" type="slidenum">
               <a:rPr lang="en-GB" smtClean="0"/>
-              <a:t>‹#›</a:t>
+              <a:t>‹nr.›</a:t>
             </a:fld>
             <a:endParaRPr lang="en-GB"/>
           </a:p>
@@ -766,7 +778,7 @@
           <a:p>
             <a:fld id="{D8CD0494-F96A-4062-BBA3-9C20345F7331}" type="datetimeFigureOut">
               <a:rPr lang="en-GB" smtClean="0"/>
-              <a:t>30/04/2017</a:t>
+              <a:t>01/05/2017</a:t>
             </a:fld>
             <a:endParaRPr lang="en-GB"/>
           </a:p>
@@ -808,7 +820,7 @@
           <a:p>
             <a:fld id="{96259E1A-2B77-495C-A47C-130D6931EF05}" type="slidenum">
               <a:rPr lang="en-GB" smtClean="0"/>
-              <a:t>‹#›</a:t>
+              <a:t>‹nr.›</a:t>
             </a:fld>
             <a:endParaRPr lang="en-GB"/>
           </a:p>
@@ -1012,7 +1024,7 @@
           <a:p>
             <a:fld id="{D8CD0494-F96A-4062-BBA3-9C20345F7331}" type="datetimeFigureOut">
               <a:rPr lang="en-GB" smtClean="0"/>
-              <a:t>30/04/2017</a:t>
+              <a:t>01/05/2017</a:t>
             </a:fld>
             <a:endParaRPr lang="en-GB"/>
           </a:p>
@@ -1054,7 +1066,7 @@
           <a:p>
             <a:fld id="{96259E1A-2B77-495C-A47C-130D6931EF05}" type="slidenum">
               <a:rPr lang="en-GB" smtClean="0"/>
-              <a:t>‹#›</a:t>
+              <a:t>‹nr.›</a:t>
             </a:fld>
             <a:endParaRPr lang="en-GB"/>
           </a:p>
@@ -1244,7 +1256,7 @@
           <a:p>
             <a:fld id="{D8CD0494-F96A-4062-BBA3-9C20345F7331}" type="datetimeFigureOut">
               <a:rPr lang="en-GB" smtClean="0"/>
-              <a:t>30/04/2017</a:t>
+              <a:t>01/05/2017</a:t>
             </a:fld>
             <a:endParaRPr lang="en-GB"/>
           </a:p>
@@ -1286,7 +1298,7 @@
           <a:p>
             <a:fld id="{96259E1A-2B77-495C-A47C-130D6931EF05}" type="slidenum">
               <a:rPr lang="en-GB" smtClean="0"/>
-              <a:t>‹#›</a:t>
+              <a:t>‹nr.›</a:t>
             </a:fld>
             <a:endParaRPr lang="en-GB"/>
           </a:p>
@@ -1611,7 +1623,7 @@
           <a:p>
             <a:fld id="{D8CD0494-F96A-4062-BBA3-9C20345F7331}" type="datetimeFigureOut">
               <a:rPr lang="en-GB" smtClean="0"/>
-              <a:t>30/04/2017</a:t>
+              <a:t>01/05/2017</a:t>
             </a:fld>
             <a:endParaRPr lang="en-GB"/>
           </a:p>
@@ -1653,7 +1665,7 @@
           <a:p>
             <a:fld id="{96259E1A-2B77-495C-A47C-130D6931EF05}" type="slidenum">
               <a:rPr lang="en-GB" smtClean="0"/>
-              <a:t>‹#›</a:t>
+              <a:t>‹nr.›</a:t>
             </a:fld>
             <a:endParaRPr lang="en-GB"/>
           </a:p>
@@ -1729,7 +1741,7 @@
           <a:p>
             <a:fld id="{D8CD0494-F96A-4062-BBA3-9C20345F7331}" type="datetimeFigureOut">
               <a:rPr lang="en-GB" smtClean="0"/>
-              <a:t>30/04/2017</a:t>
+              <a:t>01/05/2017</a:t>
             </a:fld>
             <a:endParaRPr lang="en-GB"/>
           </a:p>
@@ -1771,7 +1783,7 @@
           <a:p>
             <a:fld id="{96259E1A-2B77-495C-A47C-130D6931EF05}" type="slidenum">
               <a:rPr lang="en-GB" smtClean="0"/>
-              <a:t>‹#›</a:t>
+              <a:t>‹nr.›</a:t>
             </a:fld>
             <a:endParaRPr lang="en-GB"/>
           </a:p>
@@ -1824,7 +1836,7 @@
           <a:p>
             <a:fld id="{D8CD0494-F96A-4062-BBA3-9C20345F7331}" type="datetimeFigureOut">
               <a:rPr lang="en-GB" smtClean="0"/>
-              <a:t>30/04/2017</a:t>
+              <a:t>01/05/2017</a:t>
             </a:fld>
             <a:endParaRPr lang="en-GB"/>
           </a:p>
@@ -1866,7 +1878,7 @@
           <a:p>
             <a:fld id="{96259E1A-2B77-495C-A47C-130D6931EF05}" type="slidenum">
               <a:rPr lang="en-GB" smtClean="0"/>
-              <a:t>‹#›</a:t>
+              <a:t>‹nr.›</a:t>
             </a:fld>
             <a:endParaRPr lang="en-GB"/>
           </a:p>
@@ -2101,7 +2113,7 @@
           <a:p>
             <a:fld id="{D8CD0494-F96A-4062-BBA3-9C20345F7331}" type="datetimeFigureOut">
               <a:rPr lang="en-GB" smtClean="0"/>
-              <a:t>30/04/2017</a:t>
+              <a:t>01/05/2017</a:t>
             </a:fld>
             <a:endParaRPr lang="en-GB"/>
           </a:p>
@@ -2143,7 +2155,7 @@
           <a:p>
             <a:fld id="{96259E1A-2B77-495C-A47C-130D6931EF05}" type="slidenum">
               <a:rPr lang="en-GB" smtClean="0"/>
-              <a:t>‹#›</a:t>
+              <a:t>‹nr.›</a:t>
             </a:fld>
             <a:endParaRPr lang="en-GB"/>
           </a:p>
@@ -2354,7 +2366,7 @@
           <a:p>
             <a:fld id="{D8CD0494-F96A-4062-BBA3-9C20345F7331}" type="datetimeFigureOut">
               <a:rPr lang="en-GB" smtClean="0"/>
-              <a:t>30/04/2017</a:t>
+              <a:t>01/05/2017</a:t>
             </a:fld>
             <a:endParaRPr lang="en-GB"/>
           </a:p>
@@ -2396,7 +2408,7 @@
           <a:p>
             <a:fld id="{96259E1A-2B77-495C-A47C-130D6931EF05}" type="slidenum">
               <a:rPr lang="en-GB" smtClean="0"/>
-              <a:t>‹#›</a:t>
+              <a:t>‹nr.›</a:t>
             </a:fld>
             <a:endParaRPr lang="en-GB"/>
           </a:p>
@@ -2567,7 +2579,7 @@
           <a:p>
             <a:fld id="{D8CD0494-F96A-4062-BBA3-9C20345F7331}" type="datetimeFigureOut">
               <a:rPr lang="en-GB" smtClean="0"/>
-              <a:t>30/04/2017</a:t>
+              <a:t>01/05/2017</a:t>
             </a:fld>
             <a:endParaRPr lang="en-GB"/>
           </a:p>
@@ -2645,7 +2657,7 @@
           <a:p>
             <a:fld id="{96259E1A-2B77-495C-A47C-130D6931EF05}" type="slidenum">
               <a:rPr lang="en-GB" smtClean="0"/>
-              <a:t>‹#›</a:t>
+              <a:t>‹nr.›</a:t>
             </a:fld>
             <a:endParaRPr lang="en-GB"/>
           </a:p>
@@ -2989,35 +3001,8 @@
           <a:p>
             <a:r>
               <a:rPr lang="en-GB" dirty="0"/>
-              <a:t>C# training </a:t>
-            </a:r>
-            <a:r>
-              <a:rPr lang="en-GB" dirty="0" err="1"/>
-              <a:t>voor</a:t>
-            </a:r>
-            <a:r>
-              <a:rPr lang="en-GB" dirty="0"/>
-              <a:t> testers</a:t>
-            </a:r>
-          </a:p>
-        </p:txBody>
-      </p:sp>
-      <p:sp>
-        <p:nvSpPr>
-          <p:cNvPr id="3" name="Subtitle 2"/>
-          <p:cNvSpPr>
-            <a:spLocks noGrp="1"/>
-          </p:cNvSpPr>
-          <p:nvPr>
-            <p:ph type="subTitle" idx="1"/>
-          </p:nvPr>
-        </p:nvSpPr>
-        <p:spPr/>
-        <p:txBody>
-          <a:bodyPr/>
-          <a:lstStyle/>
-          <a:p>
-            <a:endParaRPr lang="en-GB" dirty="0"/>
+              <a:t>C# training voor testers</a:t>
+            </a:r>
           </a:p>
         </p:txBody>
       </p:sp>
@@ -3025,6 +3010,381 @@
     <p:extLst>
       <p:ext uri="{BB962C8B-B14F-4D97-AF65-F5344CB8AC3E}">
         <p14:creationId xmlns:p14="http://schemas.microsoft.com/office/powerpoint/2010/main" val="1284092194"/>
+      </p:ext>
+    </p:extLst>
+  </p:cSld>
+  <p:clrMapOvr>
+    <a:masterClrMapping/>
+  </p:clrMapOvr>
+</p:sld>
+</file>
+
+<file path=ppt/slides/slide10.xml><?xml version="1.0" encoding="utf-8"?>
+<p:sld xmlns:a="http://schemas.openxmlformats.org/drawingml/2006/main" xmlns:r="http://schemas.openxmlformats.org/officeDocument/2006/relationships" xmlns:p="http://schemas.openxmlformats.org/presentationml/2006/main">
+  <p:cSld>
+    <p:spTree>
+      <p:nvGrpSpPr>
+        <p:cNvPr id="1" name=""/>
+        <p:cNvGrpSpPr/>
+        <p:nvPr/>
+      </p:nvGrpSpPr>
+      <p:grpSpPr>
+        <a:xfrm>
+          <a:off x="0" y="0"/>
+          <a:ext cx="0" cy="0"/>
+          <a:chOff x="0" y="0"/>
+          <a:chExt cx="0" cy="0"/>
+        </a:xfrm>
+      </p:grpSpPr>
+      <p:sp>
+        <p:nvSpPr>
+          <p:cNvPr id="2" name="Titel 1"/>
+          <p:cNvSpPr>
+            <a:spLocks noGrp="1"/>
+          </p:cNvSpPr>
+          <p:nvPr>
+            <p:ph type="title"/>
+          </p:nvPr>
+        </p:nvSpPr>
+        <p:spPr/>
+        <p:txBody>
+          <a:bodyPr/>
+          <a:lstStyle/>
+          <a:p>
+            <a:r>
+              <a:rPr lang="nl-NL" dirty="0"/>
+              <a:t>LINQ</a:t>
+            </a:r>
+            <a:endParaRPr lang="nl-NL" dirty="0"/>
+          </a:p>
+        </p:txBody>
+      </p:sp>
+      <p:sp>
+        <p:nvSpPr>
+          <p:cNvPr id="3" name="Tijdelijke aanduiding voor inhoud 2"/>
+          <p:cNvSpPr>
+            <a:spLocks noGrp="1"/>
+          </p:cNvSpPr>
+          <p:nvPr>
+            <p:ph idx="1"/>
+          </p:nvPr>
+        </p:nvSpPr>
+        <p:spPr/>
+        <p:txBody>
+          <a:bodyPr/>
+          <a:lstStyle/>
+          <a:p>
+            <a:r>
+              <a:rPr lang="nl-NL" dirty="0" err="1"/>
+              <a:t>Lambda</a:t>
+            </a:r>
+            <a:r>
+              <a:rPr lang="nl-NL" dirty="0"/>
+              <a:t> </a:t>
+            </a:r>
+            <a:r>
+              <a:rPr lang="nl-NL" dirty="0" err="1"/>
+              <a:t>Expression</a:t>
+            </a:r>
+            <a:endParaRPr lang="nl-NL" dirty="0"/>
+          </a:p>
+          <a:p>
+            <a:r>
+              <a:rPr lang="nl-NL" dirty="0"/>
+              <a:t>Query Syntax </a:t>
+            </a:r>
+            <a:r>
+              <a:rPr lang="nl-NL" dirty="0" err="1"/>
+              <a:t>vs</a:t>
+            </a:r>
+            <a:r>
+              <a:rPr lang="nl-NL" dirty="0"/>
+              <a:t> Method Syntax</a:t>
+            </a:r>
+          </a:p>
+          <a:p>
+            <a:r>
+              <a:rPr lang="nl-NL" dirty="0" err="1"/>
+              <a:t>IQueryable</a:t>
+            </a:r>
+            <a:endParaRPr lang="nl-NL" dirty="0"/>
+          </a:p>
+        </p:txBody>
+      </p:sp>
+    </p:spTree>
+    <p:extLst>
+      <p:ext uri="{BB962C8B-B14F-4D97-AF65-F5344CB8AC3E}">
+        <p14:creationId xmlns:p14="http://schemas.microsoft.com/office/powerpoint/2010/main" val="2361644408"/>
+      </p:ext>
+    </p:extLst>
+  </p:cSld>
+  <p:clrMapOvr>
+    <a:masterClrMapping/>
+  </p:clrMapOvr>
+</p:sld>
+</file>
+
+<file path=ppt/slides/slide11.xml><?xml version="1.0" encoding="utf-8"?>
+<p:sld xmlns:a="http://schemas.openxmlformats.org/drawingml/2006/main" xmlns:r="http://schemas.openxmlformats.org/officeDocument/2006/relationships" xmlns:p="http://schemas.openxmlformats.org/presentationml/2006/main">
+  <p:cSld>
+    <p:spTree>
+      <p:nvGrpSpPr>
+        <p:cNvPr id="1" name=""/>
+        <p:cNvGrpSpPr/>
+        <p:nvPr/>
+      </p:nvGrpSpPr>
+      <p:grpSpPr>
+        <a:xfrm>
+          <a:off x="0" y="0"/>
+          <a:ext cx="0" cy="0"/>
+          <a:chOff x="0" y="0"/>
+          <a:chExt cx="0" cy="0"/>
+        </a:xfrm>
+      </p:grpSpPr>
+      <p:sp>
+        <p:nvSpPr>
+          <p:cNvPr id="2" name="Titel 1"/>
+          <p:cNvSpPr>
+            <a:spLocks noGrp="1"/>
+          </p:cNvSpPr>
+          <p:nvPr>
+            <p:ph type="title"/>
+          </p:nvPr>
+        </p:nvSpPr>
+        <p:spPr/>
+        <p:txBody>
+          <a:bodyPr/>
+          <a:lstStyle/>
+          <a:p>
+            <a:r>
+              <a:rPr lang="nl-NL" dirty="0"/>
+              <a:t>OOP</a:t>
+            </a:r>
+            <a:endParaRPr lang="nl-NL" dirty="0"/>
+          </a:p>
+        </p:txBody>
+      </p:sp>
+      <p:pic>
+        <p:nvPicPr>
+          <p:cNvPr id="4" name="Tijdelijke aanduiding voor inhoud 3"/>
+          <p:cNvPicPr>
+            <a:picLocks noGrp="1" noChangeAspect="1"/>
+          </p:cNvPicPr>
+          <p:nvPr>
+            <p:ph idx="1"/>
+          </p:nvPr>
+        </p:nvPicPr>
+        <p:blipFill>
+          <a:blip r:embed="rId2">
+            <a:extLst>
+              <a:ext uri="{28A0092B-C50C-407E-A947-70E740481C1C}">
+                <a14:useLocalDpi xmlns:a14="http://schemas.microsoft.com/office/drawing/2010/main" val="0"/>
+              </a:ext>
+            </a:extLst>
+          </a:blip>
+          <a:stretch>
+            <a:fillRect/>
+          </a:stretch>
+        </p:blipFill>
+        <p:spPr>
+          <a:xfrm>
+            <a:off x="628649" y="1567543"/>
+            <a:ext cx="4954115" cy="4662696"/>
+          </a:xfrm>
+        </p:spPr>
+      </p:pic>
+    </p:spTree>
+    <p:extLst>
+      <p:ext uri="{BB962C8B-B14F-4D97-AF65-F5344CB8AC3E}">
+        <p14:creationId xmlns:p14="http://schemas.microsoft.com/office/powerpoint/2010/main" val="4221158337"/>
+      </p:ext>
+    </p:extLst>
+  </p:cSld>
+  <p:clrMapOvr>
+    <a:masterClrMapping/>
+  </p:clrMapOvr>
+</p:sld>
+</file>
+
+<file path=ppt/slides/slide12.xml><?xml version="1.0" encoding="utf-8"?>
+<p:sld xmlns:a="http://schemas.openxmlformats.org/drawingml/2006/main" xmlns:r="http://schemas.openxmlformats.org/officeDocument/2006/relationships" xmlns:p="http://schemas.openxmlformats.org/presentationml/2006/main">
+  <p:cSld>
+    <p:spTree>
+      <p:nvGrpSpPr>
+        <p:cNvPr id="1" name=""/>
+        <p:cNvGrpSpPr/>
+        <p:nvPr/>
+      </p:nvGrpSpPr>
+      <p:grpSpPr>
+        <a:xfrm>
+          <a:off x="0" y="0"/>
+          <a:ext cx="0" cy="0"/>
+          <a:chOff x="0" y="0"/>
+          <a:chExt cx="0" cy="0"/>
+        </a:xfrm>
+      </p:grpSpPr>
+      <p:sp>
+        <p:nvSpPr>
+          <p:cNvPr id="2" name="Titel 1"/>
+          <p:cNvSpPr>
+            <a:spLocks noGrp="1"/>
+          </p:cNvSpPr>
+          <p:nvPr>
+            <p:ph type="title"/>
+          </p:nvPr>
+        </p:nvSpPr>
+        <p:spPr/>
+        <p:txBody>
+          <a:bodyPr/>
+          <a:lstStyle/>
+          <a:p>
+            <a:r>
+              <a:rPr lang="nl-NL" dirty="0"/>
+              <a:t>C# tips &amp; tricks</a:t>
+            </a:r>
+            <a:endParaRPr lang="nl-NL" dirty="0"/>
+          </a:p>
+        </p:txBody>
+      </p:sp>
+      <p:sp>
+        <p:nvSpPr>
+          <p:cNvPr id="3" name="Tijdelijke aanduiding voor inhoud 2"/>
+          <p:cNvSpPr>
+            <a:spLocks noGrp="1"/>
+          </p:cNvSpPr>
+          <p:nvPr>
+            <p:ph idx="1"/>
+          </p:nvPr>
+        </p:nvSpPr>
+        <p:spPr/>
+        <p:txBody>
+          <a:bodyPr>
+            <a:normAutofit/>
+          </a:bodyPr>
+          <a:lstStyle/>
+          <a:p>
+            <a:r>
+              <a:rPr lang="nl-NL" dirty="0"/>
+              <a:t>Default/</a:t>
+            </a:r>
+            <a:r>
+              <a:rPr lang="nl-NL" dirty="0" err="1"/>
+              <a:t>named</a:t>
+            </a:r>
+            <a:r>
+              <a:rPr lang="nl-NL" dirty="0"/>
+              <a:t> parameters</a:t>
+            </a:r>
+          </a:p>
+          <a:p>
+            <a:pPr marL="0" indent="0">
+              <a:buNone/>
+            </a:pPr>
+            <a:r>
+              <a:rPr lang="nl-NL" dirty="0"/>
+              <a:t>C#6.0 (Visual studio 2015):</a:t>
+            </a:r>
+          </a:p>
+          <a:p>
+            <a:r>
+              <a:rPr lang="nl-NL" dirty="0"/>
+              <a:t>String </a:t>
+            </a:r>
+            <a:r>
+              <a:rPr lang="nl-NL" dirty="0" err="1"/>
+              <a:t>interpolation</a:t>
+            </a:r>
+            <a:endParaRPr lang="nl-NL" dirty="0"/>
+          </a:p>
+          <a:p>
+            <a:r>
+              <a:rPr lang="nl-NL" dirty="0" err="1"/>
+              <a:t>Null-conditional</a:t>
+            </a:r>
+            <a:r>
+              <a:rPr lang="nl-NL" dirty="0"/>
+              <a:t> operator</a:t>
+            </a:r>
+          </a:p>
+          <a:p>
+            <a:r>
+              <a:rPr lang="nl-NL" dirty="0" err="1"/>
+              <a:t>Nameof</a:t>
+            </a:r>
+            <a:r>
+              <a:rPr lang="nl-NL" dirty="0"/>
+              <a:t>(</a:t>
+            </a:r>
+            <a:r>
+              <a:rPr lang="nl-NL" dirty="0" err="1"/>
+              <a:t>method</a:t>
+            </a:r>
+            <a:r>
+              <a:rPr lang="nl-NL" dirty="0"/>
+              <a:t>)</a:t>
+            </a:r>
+          </a:p>
+          <a:p>
+            <a:r>
+              <a:rPr lang="nl-NL" dirty="0" err="1"/>
+              <a:t>Expressed</a:t>
+            </a:r>
+            <a:r>
+              <a:rPr lang="nl-NL" dirty="0"/>
+              <a:t> </a:t>
+            </a:r>
+            <a:r>
+              <a:rPr lang="nl-NL" dirty="0" err="1"/>
+              <a:t>bodied</a:t>
+            </a:r>
+            <a:r>
+              <a:rPr lang="nl-NL" dirty="0"/>
+              <a:t> </a:t>
+            </a:r>
+            <a:r>
+              <a:rPr lang="nl-NL" dirty="0" err="1"/>
+              <a:t>functions</a:t>
+            </a:r>
+            <a:r>
+              <a:rPr lang="nl-NL" dirty="0"/>
+              <a:t> </a:t>
+            </a:r>
+            <a:r>
+              <a:rPr lang="nl-NL" dirty="0" err="1"/>
+              <a:t>and</a:t>
+            </a:r>
+            <a:r>
+              <a:rPr lang="nl-NL" dirty="0"/>
+              <a:t> </a:t>
+            </a:r>
+            <a:r>
+              <a:rPr lang="nl-NL" dirty="0" err="1"/>
+              <a:t>properties</a:t>
+            </a:r>
+            <a:endParaRPr lang="nl-NL" dirty="0"/>
+          </a:p>
+          <a:p>
+            <a:pPr marL="0" indent="0">
+              <a:buNone/>
+            </a:pPr>
+            <a:r>
+              <a:rPr lang="nl-NL" dirty="0"/>
+              <a:t>C#7.0 (Visual studio 2017):</a:t>
+            </a:r>
+            <a:endParaRPr lang="nl-NL" dirty="0"/>
+          </a:p>
+          <a:p>
+            <a:r>
+              <a:rPr lang="nl-NL" dirty="0"/>
+              <a:t>Out variables</a:t>
+            </a:r>
+          </a:p>
+        </p:txBody>
+      </p:sp>
+    </p:spTree>
+    <p:extLst>
+      <p:ext uri="{BB962C8B-B14F-4D97-AF65-F5344CB8AC3E}">
+        <p14:creationId xmlns:p14="http://schemas.microsoft.com/office/powerpoint/2010/main" val="2003180923"/>
       </p:ext>
     </p:extLst>
   </p:cSld>
@@ -3053,7 +3413,7 @@
       </p:grpSpPr>
       <p:sp>
         <p:nvSpPr>
-          <p:cNvPr id="2" name="Title 1"/>
+          <p:cNvPr id="2" name="Titel 1"/>
           <p:cNvSpPr>
             <a:spLocks noGrp="1"/>
           </p:cNvSpPr>
@@ -3067,15 +3427,15 @@
           <a:lstStyle/>
           <a:p>
             <a:r>
-              <a:rPr lang="en-GB" dirty="0"/>
-              <a:t>Access Modifiers</a:t>
-            </a:r>
-          </a:p>
-        </p:txBody>
-      </p:sp>
-      <p:sp>
-        <p:nvSpPr>
-          <p:cNvPr id="3" name="Content Placeholder 2"/>
+              <a:rPr lang="nl-NL" dirty="0"/>
+              <a:t>Inhoud</a:t>
+            </a:r>
+          </a:p>
+        </p:txBody>
+      </p:sp>
+      <p:sp>
+        <p:nvSpPr>
+          <p:cNvPr id="3" name="Tijdelijke aanduiding voor inhoud 2"/>
           <p:cNvSpPr>
             <a:spLocks noGrp="1"/>
           </p:cNvSpPr>
@@ -3085,39 +3445,99 @@
         </p:nvSpPr>
         <p:spPr/>
         <p:txBody>
-          <a:bodyPr/>
-          <a:lstStyle/>
-          <a:p>
-            <a:r>
-              <a:rPr lang="en-GB" dirty="0"/>
-              <a:t>Public</a:t>
-            </a:r>
-          </a:p>
-          <a:p>
-            <a:r>
-              <a:rPr lang="en-GB"/>
-              <a:t>Private</a:t>
-            </a:r>
-            <a:endParaRPr lang="en-GB" dirty="0"/>
-          </a:p>
-          <a:p>
-            <a:r>
-              <a:rPr lang="en-GB" dirty="0"/>
-              <a:t>Protected</a:t>
-            </a:r>
-          </a:p>
-          <a:p>
-            <a:r>
-              <a:rPr lang="en-GB" dirty="0"/>
-              <a:t>Internal</a:t>
-            </a:r>
+          <a:bodyPr>
+            <a:normAutofit fontScale="92500" lnSpcReduction="20000"/>
+          </a:bodyPr>
+          <a:lstStyle/>
+          <a:p>
+            <a:r>
+              <a:rPr lang="nl-NL" dirty="0"/>
+              <a:t>Waarom deze cursus?</a:t>
+            </a:r>
+          </a:p>
+          <a:p>
+            <a:r>
+              <a:rPr lang="nl-NL" dirty="0" err="1"/>
+              <a:t>Primitive</a:t>
+            </a:r>
+            <a:r>
+              <a:rPr lang="nl-NL" dirty="0"/>
+              <a:t>/Value/Reference Types</a:t>
+            </a:r>
+            <a:endParaRPr lang="nl-NL" dirty="0"/>
+          </a:p>
+          <a:p>
+            <a:r>
+              <a:rPr lang="nl-NL" dirty="0"/>
+              <a:t>Access </a:t>
+            </a:r>
+            <a:r>
+              <a:rPr lang="nl-NL" dirty="0" err="1"/>
+              <a:t>Modifiers</a:t>
+            </a:r>
+            <a:endParaRPr lang="nl-NL" dirty="0"/>
+          </a:p>
+          <a:p>
+            <a:r>
+              <a:rPr lang="nl-NL" dirty="0" err="1"/>
+              <a:t>Collections</a:t>
+            </a:r>
+            <a:endParaRPr lang="nl-NL" dirty="0"/>
+          </a:p>
+          <a:p>
+            <a:r>
+              <a:rPr lang="nl-NL" dirty="0" err="1"/>
+              <a:t>Constructors</a:t>
+            </a:r>
+            <a:r>
+              <a:rPr lang="nl-NL" dirty="0"/>
+              <a:t>/Destructors</a:t>
+            </a:r>
+          </a:p>
+          <a:p>
+            <a:r>
+              <a:rPr lang="nl-NL" dirty="0" err="1"/>
+              <a:t>Inheritance</a:t>
+            </a:r>
+            <a:endParaRPr lang="nl-NL" dirty="0"/>
+          </a:p>
+          <a:p>
+            <a:r>
+              <a:rPr lang="nl-NL" dirty="0" err="1"/>
+              <a:t>Exception</a:t>
+            </a:r>
+            <a:r>
+              <a:rPr lang="nl-NL" dirty="0"/>
+              <a:t> Handling</a:t>
+            </a:r>
+          </a:p>
+          <a:p>
+            <a:r>
+              <a:rPr lang="nl-NL" dirty="0"/>
+              <a:t>LINQ</a:t>
+            </a:r>
+          </a:p>
+          <a:p>
+            <a:r>
+              <a:rPr lang="nl-NL" dirty="0"/>
+              <a:t>OOP</a:t>
+            </a:r>
+          </a:p>
+          <a:p>
+            <a:r>
+              <a:rPr lang="nl-NL" dirty="0"/>
+              <a:t>C# Tips &amp; Tricks</a:t>
+            </a:r>
+          </a:p>
+          <a:p>
+            <a:endParaRPr lang="nl-NL" dirty="0"/>
           </a:p>
         </p:txBody>
       </p:sp>
     </p:spTree>
     <p:extLst>
       <p:ext uri="{BB962C8B-B14F-4D97-AF65-F5344CB8AC3E}">
-        <p14:creationId xmlns:p14="http://schemas.microsoft.com/office/powerpoint/2010/main" val="3424653456"/>
+        <p14:creationId xmlns:p14="http://schemas.microsoft.com/office/powerpoint/2010/main" val="948686250"/>
       </p:ext>
     </p:extLst>
   </p:cSld>
@@ -3146,7 +3566,7 @@
       </p:grpSpPr>
       <p:sp>
         <p:nvSpPr>
-          <p:cNvPr id="2" name="Title 1"/>
+          <p:cNvPr id="2" name="Titel 1"/>
           <p:cNvSpPr>
             <a:spLocks noGrp="1"/>
           </p:cNvSpPr>
@@ -3160,15 +3580,15 @@
           <a:lstStyle/>
           <a:p>
             <a:r>
-              <a:rPr lang="en-GB" dirty="0"/>
-              <a:t>Collections</a:t>
-            </a:r>
-          </a:p>
-        </p:txBody>
-      </p:sp>
-      <p:sp>
-        <p:nvSpPr>
-          <p:cNvPr id="3" name="Content Placeholder 2"/>
+              <a:rPr lang="nl-NL" dirty="0"/>
+              <a:t>Waarom deze cursus?</a:t>
+            </a:r>
+          </a:p>
+        </p:txBody>
+      </p:sp>
+      <p:sp>
+        <p:nvSpPr>
+          <p:cNvPr id="3" name="Tijdelijke aanduiding voor inhoud 2"/>
           <p:cNvSpPr>
             <a:spLocks noGrp="1"/>
           </p:cNvSpPr>
@@ -3182,302 +3602,42 @@
           <a:lstStyle/>
           <a:p>
             <a:r>
-              <a:rPr lang="en-GB" dirty="0"/>
-              <a:t>Array</a:t>
-            </a:r>
-          </a:p>
-          <a:p>
-            <a:r>
-              <a:rPr lang="en-GB" dirty="0"/>
-              <a:t>List</a:t>
-            </a:r>
-          </a:p>
-          <a:p>
-            <a:r>
-              <a:rPr lang="en-GB" dirty="0"/>
-              <a:t>Enumerable</a:t>
-            </a:r>
-          </a:p>
-          <a:p>
-            <a:r>
-              <a:rPr lang="en-GB" dirty="0"/>
-              <a:t>Dictionary</a:t>
-            </a:r>
-          </a:p>
-          <a:p>
-            <a:r>
-              <a:rPr lang="en-GB" dirty="0" err="1"/>
-              <a:t>ExpendoObject</a:t>
-            </a:r>
-            <a:endParaRPr lang="en-GB" dirty="0"/>
-          </a:p>
-          <a:p>
-            <a:endParaRPr lang="en-GB" dirty="0"/>
+              <a:rPr lang="nl-NL" dirty="0"/>
+              <a:t>Meer inzicht</a:t>
+            </a:r>
+          </a:p>
+          <a:p>
+            <a:r>
+              <a:rPr lang="nl-NL" dirty="0"/>
+              <a:t>Betere </a:t>
+            </a:r>
+            <a:r>
+              <a:rPr lang="nl-NL" dirty="0" err="1"/>
+              <a:t>onderhoudbaarheid</a:t>
+            </a:r>
+            <a:endParaRPr lang="nl-NL" dirty="0"/>
+          </a:p>
+          <a:p>
+            <a:r>
+              <a:rPr lang="nl-NL" dirty="0"/>
+              <a:t>Makkelijker code schrijven</a:t>
+            </a:r>
+          </a:p>
+          <a:p>
+            <a:endParaRPr lang="nl-NL" dirty="0"/>
           </a:p>
         </p:txBody>
       </p:sp>
     </p:spTree>
     <p:extLst>
       <p:ext uri="{BB962C8B-B14F-4D97-AF65-F5344CB8AC3E}">
-        <p14:creationId xmlns:p14="http://schemas.microsoft.com/office/powerpoint/2010/main" val="477007565"/>
+        <p14:creationId xmlns:p14="http://schemas.microsoft.com/office/powerpoint/2010/main" val="2503484573"/>
       </p:ext>
     </p:extLst>
   </p:cSld>
   <p:clrMapOvr>
     <a:masterClrMapping/>
   </p:clrMapOvr>
-  <p:timing>
-    <p:tnLst>
-      <p:par>
-        <p:cTn id="1" dur="indefinite" restart="never" nodeType="tmRoot">
-          <p:childTnLst>
-            <p:seq concurrent="1" nextAc="seek">
-              <p:cTn id="2" dur="indefinite" nodeType="mainSeq">
-                <p:childTnLst>
-                  <p:par>
-                    <p:cTn id="3" fill="hold">
-                      <p:stCondLst>
-                        <p:cond delay="indefinite"/>
-                      </p:stCondLst>
-                      <p:childTnLst>
-                        <p:par>
-                          <p:cTn id="4" fill="hold">
-                            <p:stCondLst>
-                              <p:cond delay="0"/>
-                            </p:stCondLst>
-                            <p:childTnLst>
-                              <p:par>
-                                <p:cTn id="5" presetID="1" presetClass="entr" presetSubtype="0" fill="hold" grpId="0" nodeType="clickEffect">
-                                  <p:stCondLst>
-                                    <p:cond delay="0"/>
-                                  </p:stCondLst>
-                                  <p:childTnLst>
-                                    <p:set>
-                                      <p:cBhvr>
-                                        <p:cTn id="6" dur="1" fill="hold">
-                                          <p:stCondLst>
-                                            <p:cond delay="0"/>
-                                          </p:stCondLst>
-                                        </p:cTn>
-                                        <p:tgtEl>
-                                          <p:spTgt spid="2"/>
-                                        </p:tgtEl>
-                                        <p:attrNameLst>
-                                          <p:attrName>style.visibility</p:attrName>
-                                        </p:attrNameLst>
-                                      </p:cBhvr>
-                                      <p:to>
-                                        <p:strVal val="visible"/>
-                                      </p:to>
-                                    </p:set>
-                                  </p:childTnLst>
-                                </p:cTn>
-                              </p:par>
-                            </p:childTnLst>
-                          </p:cTn>
-                        </p:par>
-                      </p:childTnLst>
-                    </p:cTn>
-                  </p:par>
-                  <p:par>
-                    <p:cTn id="7" fill="hold">
-                      <p:stCondLst>
-                        <p:cond delay="indefinite"/>
-                      </p:stCondLst>
-                      <p:childTnLst>
-                        <p:par>
-                          <p:cTn id="8" fill="hold">
-                            <p:stCondLst>
-                              <p:cond delay="0"/>
-                            </p:stCondLst>
-                            <p:childTnLst>
-                              <p:par>
-                                <p:cTn id="9" presetID="1" presetClass="entr" presetSubtype="0" fill="hold" grpId="0" nodeType="clickEffect">
-                                  <p:stCondLst>
-                                    <p:cond delay="0"/>
-                                  </p:stCondLst>
-                                  <p:childTnLst>
-                                    <p:set>
-                                      <p:cBhvr>
-                                        <p:cTn id="10" dur="1" fill="hold">
-                                          <p:stCondLst>
-                                            <p:cond delay="0"/>
-                                          </p:stCondLst>
-                                        </p:cTn>
-                                        <p:tgtEl>
-                                          <p:spTgt spid="3">
-                                            <p:txEl>
-                                              <p:pRg st="0" end="0"/>
-                                            </p:txEl>
-                                          </p:spTgt>
-                                        </p:tgtEl>
-                                        <p:attrNameLst>
-                                          <p:attrName>style.visibility</p:attrName>
-                                        </p:attrNameLst>
-                                      </p:cBhvr>
-                                      <p:to>
-                                        <p:strVal val="visible"/>
-                                      </p:to>
-                                    </p:set>
-                                  </p:childTnLst>
-                                </p:cTn>
-                              </p:par>
-                              <p:par>
-                                <p:cTn id="11" presetID="1" presetClass="entr" presetSubtype="0" fill="hold" grpId="0" nodeType="withEffect">
-                                  <p:stCondLst>
-                                    <p:cond delay="0"/>
-                                  </p:stCondLst>
-                                  <p:childTnLst>
-                                    <p:set>
-                                      <p:cBhvr>
-                                        <p:cTn id="12" dur="1" fill="hold">
-                                          <p:stCondLst>
-                                            <p:cond delay="0"/>
-                                          </p:stCondLst>
-                                        </p:cTn>
-                                        <p:tgtEl>
-                                          <p:spTgt spid="3">
-                                            <p:txEl>
-                                              <p:pRg st="1" end="1"/>
-                                            </p:txEl>
-                                          </p:spTgt>
-                                        </p:tgtEl>
-                                        <p:attrNameLst>
-                                          <p:attrName>style.visibility</p:attrName>
-                                        </p:attrNameLst>
-                                      </p:cBhvr>
-                                      <p:to>
-                                        <p:strVal val="visible"/>
-                                      </p:to>
-                                    </p:set>
-                                  </p:childTnLst>
-                                </p:cTn>
-                              </p:par>
-                              <p:par>
-                                <p:cTn id="13" presetID="1" presetClass="entr" presetSubtype="0" fill="hold" grpId="0" nodeType="withEffect">
-                                  <p:stCondLst>
-                                    <p:cond delay="0"/>
-                                  </p:stCondLst>
-                                  <p:childTnLst>
-                                    <p:set>
-                                      <p:cBhvr>
-                                        <p:cTn id="14" dur="1" fill="hold">
-                                          <p:stCondLst>
-                                            <p:cond delay="0"/>
-                                          </p:stCondLst>
-                                        </p:cTn>
-                                        <p:tgtEl>
-                                          <p:spTgt spid="3">
-                                            <p:txEl>
-                                              <p:pRg st="2" end="2"/>
-                                            </p:txEl>
-                                          </p:spTgt>
-                                        </p:tgtEl>
-                                        <p:attrNameLst>
-                                          <p:attrName>style.visibility</p:attrName>
-                                        </p:attrNameLst>
-                                      </p:cBhvr>
-                                      <p:to>
-                                        <p:strVal val="visible"/>
-                                      </p:to>
-                                    </p:set>
-                                  </p:childTnLst>
-                                </p:cTn>
-                              </p:par>
-                              <p:par>
-                                <p:cTn id="15" presetID="1" presetClass="entr" presetSubtype="0" fill="hold" grpId="0" nodeType="withEffect">
-                                  <p:stCondLst>
-                                    <p:cond delay="0"/>
-                                  </p:stCondLst>
-                                  <p:childTnLst>
-                                    <p:set>
-                                      <p:cBhvr>
-                                        <p:cTn id="16" dur="1" fill="hold">
-                                          <p:stCondLst>
-                                            <p:cond delay="0"/>
-                                          </p:stCondLst>
-                                        </p:cTn>
-                                        <p:tgtEl>
-                                          <p:spTgt spid="3">
-                                            <p:txEl>
-                                              <p:pRg st="3" end="3"/>
-                                            </p:txEl>
-                                          </p:spTgt>
-                                        </p:tgtEl>
-                                        <p:attrNameLst>
-                                          <p:attrName>style.visibility</p:attrName>
-                                        </p:attrNameLst>
-                                      </p:cBhvr>
-                                      <p:to>
-                                        <p:strVal val="visible"/>
-                                      </p:to>
-                                    </p:set>
-                                  </p:childTnLst>
-                                </p:cTn>
-                              </p:par>
-                              <p:par>
-                                <p:cTn id="17" presetID="1" presetClass="entr" presetSubtype="0" fill="hold" grpId="0" nodeType="withEffect">
-                                  <p:stCondLst>
-                                    <p:cond delay="0"/>
-                                  </p:stCondLst>
-                                  <p:childTnLst>
-                                    <p:set>
-                                      <p:cBhvr>
-                                        <p:cTn id="18" dur="1" fill="hold">
-                                          <p:stCondLst>
-                                            <p:cond delay="0"/>
-                                          </p:stCondLst>
-                                        </p:cTn>
-                                        <p:tgtEl>
-                                          <p:spTgt spid="3">
-                                            <p:txEl>
-                                              <p:pRg st="4" end="4"/>
-                                            </p:txEl>
-                                          </p:spTgt>
-                                        </p:tgtEl>
-                                        <p:attrNameLst>
-                                          <p:attrName>style.visibility</p:attrName>
-                                        </p:attrNameLst>
-                                      </p:cBhvr>
-                                      <p:to>
-                                        <p:strVal val="visible"/>
-                                      </p:to>
-                                    </p:set>
-                                  </p:childTnLst>
-                                </p:cTn>
-                              </p:par>
-                            </p:childTnLst>
-                          </p:cTn>
-                        </p:par>
-                      </p:childTnLst>
-                    </p:cTn>
-                  </p:par>
-                </p:childTnLst>
-              </p:cTn>
-              <p:prevCondLst>
-                <p:cond evt="onPrev" delay="0">
-                  <p:tgtEl>
-                    <p:sldTgt/>
-                  </p:tgtEl>
-                </p:cond>
-              </p:prevCondLst>
-              <p:nextCondLst>
-                <p:cond evt="onNext" delay="0">
-                  <p:tgtEl>
-                    <p:sldTgt/>
-                  </p:tgtEl>
-                </p:cond>
-              </p:nextCondLst>
-            </p:seq>
-          </p:childTnLst>
-        </p:cTn>
-      </p:par>
-    </p:tnLst>
-    <p:bldLst>
-      <p:bldP spid="2" grpId="0"/>
-      <p:bldP spid="3" grpId="0" build="allAtOnce"/>
-    </p:bldLst>
-  </p:timing>
 </p:sld>
 </file>
 
@@ -3500,7 +3660,7 @@
       </p:grpSpPr>
       <p:sp>
         <p:nvSpPr>
-          <p:cNvPr id="2" name="Title 1"/>
+          <p:cNvPr id="2" name="Titel 1"/>
           <p:cNvSpPr>
             <a:spLocks noGrp="1"/>
           </p:cNvSpPr>
@@ -3508,25 +3668,30 @@
             <p:ph type="title"/>
           </p:nvPr>
         </p:nvSpPr>
-        <p:spPr/>
-        <p:txBody>
-          <a:bodyPr/>
-          <a:lstStyle/>
-          <a:p>
-            <a:r>
-              <a:rPr lang="en-GB" dirty="0" err="1"/>
-              <a:t>Contructor</a:t>
-            </a:r>
-            <a:r>
-              <a:rPr lang="en-GB" dirty="0"/>
-              <a:t>/Destructor</a:t>
-            </a:r>
-          </a:p>
-        </p:txBody>
-      </p:sp>
-      <p:sp>
-        <p:nvSpPr>
-          <p:cNvPr id="3" name="Content Placeholder 2"/>
+        <p:spPr>
+          <a:xfrm>
+            <a:off x="838200" y="365126"/>
+            <a:ext cx="10515600" cy="1109112"/>
+          </a:xfrm>
+        </p:spPr>
+        <p:txBody>
+          <a:bodyPr/>
+          <a:lstStyle/>
+          <a:p>
+            <a:r>
+              <a:rPr lang="nl-NL" dirty="0" err="1"/>
+              <a:t>Primitive</a:t>
+            </a:r>
+            <a:r>
+              <a:rPr lang="nl-NL" dirty="0"/>
+              <a:t>/Value/Reference Types</a:t>
+            </a:r>
+          </a:p>
+        </p:txBody>
+      </p:sp>
+      <p:sp>
+        <p:nvSpPr>
+          <p:cNvPr id="3" name="Tijdelijke aanduiding voor inhoud 2"/>
           <p:cNvSpPr>
             <a:spLocks noGrp="1"/>
           </p:cNvSpPr>
@@ -3534,52 +3699,151 @@
             <p:ph idx="1"/>
           </p:nvPr>
         </p:nvSpPr>
-        <p:spPr/>
-        <p:txBody>
-          <a:bodyPr/>
-          <a:lstStyle/>
-          <a:p>
-            <a:r>
-              <a:rPr lang="en-GB" dirty="0"/>
-              <a:t>Het </a:t>
-            </a:r>
-            <a:r>
-              <a:rPr lang="en-GB" dirty="0" err="1"/>
-              <a:t>opzetten</a:t>
-            </a:r>
-            <a:r>
-              <a:rPr lang="en-GB" dirty="0"/>
-              <a:t> van </a:t>
-            </a:r>
-            <a:r>
-              <a:rPr lang="en-GB" dirty="0" err="1"/>
-              <a:t>een</a:t>
-            </a:r>
-            <a:r>
-              <a:rPr lang="en-GB" dirty="0"/>
-              <a:t> object</a:t>
-            </a:r>
-          </a:p>
-          <a:p>
-            <a:r>
-              <a:rPr lang="en-GB" dirty="0"/>
-              <a:t>Het </a:t>
-            </a:r>
-            <a:r>
-              <a:rPr lang="en-GB" dirty="0" err="1"/>
-              <a:t>verwijderen</a:t>
-            </a:r>
-            <a:r>
-              <a:rPr lang="en-GB" dirty="0"/>
-              <a:t> van </a:t>
-            </a:r>
-            <a:r>
-              <a:rPr lang="en-GB" dirty="0" err="1"/>
-              <a:t>een</a:t>
-            </a:r>
-            <a:r>
-              <a:rPr lang="en-GB" dirty="0"/>
-              <a:t> object</a:t>
+        <p:spPr>
+          <a:xfrm>
+            <a:off x="7494088" y="1856954"/>
+            <a:ext cx="4610879" cy="4351338"/>
+          </a:xfrm>
+        </p:spPr>
+        <p:txBody>
+          <a:bodyPr/>
+          <a:lstStyle/>
+          <a:p>
+            <a:r>
+              <a:rPr lang="nl-NL" dirty="0"/>
+              <a:t>Reference Type: </a:t>
+            </a:r>
+          </a:p>
+          <a:p>
+            <a:pPr lvl="1"/>
+            <a:r>
+              <a:rPr lang="nl-NL" dirty="0"/>
+              <a:t>Classes</a:t>
+            </a:r>
+          </a:p>
+          <a:p>
+            <a:pPr lvl="1"/>
+            <a:r>
+              <a:rPr lang="nl-NL" dirty="0" err="1"/>
+              <a:t>Properties</a:t>
+            </a:r>
+            <a:endParaRPr lang="nl-NL" dirty="0"/>
+          </a:p>
+          <a:p>
+            <a:pPr lvl="1"/>
+            <a:r>
+              <a:rPr lang="nl-NL" dirty="0"/>
+              <a:t>Strings</a:t>
+            </a:r>
+          </a:p>
+          <a:p>
+            <a:pPr lvl="1"/>
+            <a:r>
+              <a:rPr lang="nl-NL" dirty="0"/>
+              <a:t>Dynamics</a:t>
+            </a:r>
+          </a:p>
+          <a:p>
+            <a:r>
+              <a:rPr lang="nl-NL" dirty="0"/>
+              <a:t>Value Type:</a:t>
+            </a:r>
+          </a:p>
+          <a:p>
+            <a:pPr lvl="1"/>
+            <a:r>
+              <a:rPr lang="nl-NL" dirty="0" err="1"/>
+              <a:t>Primitive</a:t>
+            </a:r>
+            <a:r>
+              <a:rPr lang="nl-NL" dirty="0"/>
+              <a:t> Types (</a:t>
+            </a:r>
+            <a:r>
+              <a:rPr lang="nl-NL" dirty="0" err="1"/>
+              <a:t>muv</a:t>
+            </a:r>
+            <a:r>
+              <a:rPr lang="nl-NL" dirty="0"/>
+              <a:t> strings)</a:t>
+            </a:r>
+          </a:p>
+          <a:p>
+            <a:pPr lvl="1"/>
+            <a:r>
+              <a:rPr lang="nl-NL" dirty="0" err="1"/>
+              <a:t>Structs</a:t>
+            </a:r>
+            <a:endParaRPr lang="nl-NL" dirty="0"/>
+          </a:p>
+          <a:p>
+            <a:pPr lvl="1"/>
+            <a:endParaRPr lang="nl-NL" dirty="0"/>
+          </a:p>
+          <a:p>
+            <a:endParaRPr lang="nl-NL" dirty="0"/>
+          </a:p>
+        </p:txBody>
+      </p:sp>
+      <p:pic>
+        <p:nvPicPr>
+          <p:cNvPr id="4" name="Afbeelding 3"/>
+          <p:cNvPicPr>
+            <a:picLocks noChangeAspect="1"/>
+          </p:cNvPicPr>
+          <p:nvPr/>
+        </p:nvPicPr>
+        <p:blipFill>
+          <a:blip r:embed="rId2">
+            <a:extLst>
+              <a:ext uri="{28A0092B-C50C-407E-A947-70E740481C1C}">
+                <a14:useLocalDpi xmlns:a14="http://schemas.microsoft.com/office/drawing/2010/main" val="0"/>
+              </a:ext>
+            </a:extLst>
+          </a:blip>
+          <a:stretch>
+            <a:fillRect/>
+          </a:stretch>
+        </p:blipFill>
+        <p:spPr>
+          <a:xfrm>
+            <a:off x="838200" y="2000633"/>
+            <a:ext cx="6655889" cy="3511909"/>
+          </a:xfrm>
+          <a:prstGeom prst="rect">
+            <a:avLst/>
+          </a:prstGeom>
+        </p:spPr>
+      </p:pic>
+      <p:sp>
+        <p:nvSpPr>
+          <p:cNvPr id="5" name="Tekstvak 4"/>
+          <p:cNvSpPr txBox="1"/>
+          <p:nvPr/>
+        </p:nvSpPr>
+        <p:spPr>
+          <a:xfrm flipH="1">
+            <a:off x="838200" y="1474238"/>
+            <a:ext cx="5797477" cy="523220"/>
+          </a:xfrm>
+          <a:prstGeom prst="rect">
+            <a:avLst/>
+          </a:prstGeom>
+          <a:noFill/>
+        </p:spPr>
+        <p:txBody>
+          <a:bodyPr wrap="square" rtlCol="0">
+            <a:spAutoFit/>
+          </a:bodyPr>
+          <a:lstStyle/>
+          <a:p>
+            <a:r>
+              <a:rPr lang="nl-NL" sz="2800" dirty="0" err="1"/>
+              <a:t>Primative</a:t>
+            </a:r>
+            <a:r>
+              <a:rPr lang="nl-NL" sz="2800" dirty="0"/>
+              <a:t> types:</a:t>
             </a:r>
           </a:p>
         </p:txBody>
@@ -3587,7 +3851,7 @@
     </p:spTree>
     <p:extLst>
       <p:ext uri="{BB962C8B-B14F-4D97-AF65-F5344CB8AC3E}">
-        <p14:creationId xmlns:p14="http://schemas.microsoft.com/office/powerpoint/2010/main" val="136240204"/>
+        <p14:creationId xmlns:p14="http://schemas.microsoft.com/office/powerpoint/2010/main" val="2109972186"/>
       </p:ext>
     </p:extLst>
   </p:cSld>
@@ -3631,6 +3895,329 @@
           <a:p>
             <a:r>
               <a:rPr lang="en-GB" dirty="0"/>
+              <a:t>Access Modifiers</a:t>
+            </a:r>
+          </a:p>
+        </p:txBody>
+      </p:sp>
+      <p:sp>
+        <p:nvSpPr>
+          <p:cNvPr id="3" name="Content Placeholder 2"/>
+          <p:cNvSpPr>
+            <a:spLocks noGrp="1"/>
+          </p:cNvSpPr>
+          <p:nvPr>
+            <p:ph idx="1"/>
+          </p:nvPr>
+        </p:nvSpPr>
+        <p:spPr/>
+        <p:txBody>
+          <a:bodyPr/>
+          <a:lstStyle/>
+          <a:p>
+            <a:r>
+              <a:rPr lang="en-GB" dirty="0"/>
+              <a:t>Public</a:t>
+            </a:r>
+          </a:p>
+          <a:p>
+            <a:r>
+              <a:rPr lang="en-GB" dirty="0"/>
+              <a:t>Private</a:t>
+            </a:r>
+          </a:p>
+          <a:p>
+            <a:r>
+              <a:rPr lang="en-GB" dirty="0"/>
+              <a:t>Protected</a:t>
+            </a:r>
+          </a:p>
+          <a:p>
+            <a:r>
+              <a:rPr lang="en-GB" dirty="0"/>
+              <a:t>Internal</a:t>
+            </a:r>
+          </a:p>
+          <a:p>
+            <a:r>
+              <a:rPr lang="en-GB" dirty="0"/>
+              <a:t>Sealed</a:t>
+            </a:r>
+          </a:p>
+        </p:txBody>
+      </p:sp>
+    </p:spTree>
+    <p:extLst>
+      <p:ext uri="{BB962C8B-B14F-4D97-AF65-F5344CB8AC3E}">
+        <p14:creationId xmlns:p14="http://schemas.microsoft.com/office/powerpoint/2010/main" val="3424653456"/>
+      </p:ext>
+    </p:extLst>
+  </p:cSld>
+  <p:clrMapOvr>
+    <a:masterClrMapping/>
+  </p:clrMapOvr>
+</p:sld>
+</file>
+
+<file path=ppt/slides/slide6.xml><?xml version="1.0" encoding="utf-8"?>
+<p:sld xmlns:a="http://schemas.openxmlformats.org/drawingml/2006/main" xmlns:r="http://schemas.openxmlformats.org/officeDocument/2006/relationships" xmlns:p="http://schemas.openxmlformats.org/presentationml/2006/main">
+  <p:cSld>
+    <p:spTree>
+      <p:nvGrpSpPr>
+        <p:cNvPr id="1" name=""/>
+        <p:cNvGrpSpPr/>
+        <p:nvPr/>
+      </p:nvGrpSpPr>
+      <p:grpSpPr>
+        <a:xfrm>
+          <a:off x="0" y="0"/>
+          <a:ext cx="0" cy="0"/>
+          <a:chOff x="0" y="0"/>
+          <a:chExt cx="0" cy="0"/>
+        </a:xfrm>
+      </p:grpSpPr>
+      <p:sp>
+        <p:nvSpPr>
+          <p:cNvPr id="2" name="Title 1"/>
+          <p:cNvSpPr>
+            <a:spLocks noGrp="1"/>
+          </p:cNvSpPr>
+          <p:nvPr>
+            <p:ph type="title"/>
+          </p:nvPr>
+        </p:nvSpPr>
+        <p:spPr/>
+        <p:txBody>
+          <a:bodyPr/>
+          <a:lstStyle/>
+          <a:p>
+            <a:r>
+              <a:rPr lang="en-GB" dirty="0"/>
+              <a:t>Collections</a:t>
+            </a:r>
+          </a:p>
+        </p:txBody>
+      </p:sp>
+      <p:sp>
+        <p:nvSpPr>
+          <p:cNvPr id="3" name="Content Placeholder 2"/>
+          <p:cNvSpPr>
+            <a:spLocks noGrp="1"/>
+          </p:cNvSpPr>
+          <p:nvPr>
+            <p:ph idx="1"/>
+          </p:nvPr>
+        </p:nvSpPr>
+        <p:spPr/>
+        <p:txBody>
+          <a:bodyPr/>
+          <a:lstStyle/>
+          <a:p>
+            <a:r>
+              <a:rPr lang="en-GB" dirty="0"/>
+              <a:t>Array</a:t>
+            </a:r>
+          </a:p>
+          <a:p>
+            <a:r>
+              <a:rPr lang="en-GB" dirty="0"/>
+              <a:t>List</a:t>
+            </a:r>
+          </a:p>
+          <a:p>
+            <a:r>
+              <a:rPr lang="en-GB" dirty="0"/>
+              <a:t>Enumerable</a:t>
+            </a:r>
+          </a:p>
+          <a:p>
+            <a:r>
+              <a:rPr lang="en-GB" dirty="0"/>
+              <a:t>Dictionary</a:t>
+            </a:r>
+          </a:p>
+          <a:p>
+            <a:r>
+              <a:rPr lang="en-GB" dirty="0" err="1"/>
+              <a:t>Hashset</a:t>
+            </a:r>
+            <a:endParaRPr lang="en-GB" dirty="0"/>
+          </a:p>
+          <a:p>
+            <a:r>
+              <a:rPr lang="en-GB" dirty="0" err="1"/>
+              <a:t>ExpandoObject</a:t>
+            </a:r>
+            <a:endParaRPr lang="en-GB" dirty="0"/>
+          </a:p>
+          <a:p>
+            <a:endParaRPr lang="en-GB" dirty="0"/>
+          </a:p>
+        </p:txBody>
+      </p:sp>
+    </p:spTree>
+    <p:extLst>
+      <p:ext uri="{BB962C8B-B14F-4D97-AF65-F5344CB8AC3E}">
+        <p14:creationId xmlns:p14="http://schemas.microsoft.com/office/powerpoint/2010/main" val="477007565"/>
+      </p:ext>
+    </p:extLst>
+  </p:cSld>
+  <p:clrMapOvr>
+    <a:masterClrMapping/>
+  </p:clrMapOvr>
+</p:sld>
+</file>
+
+<file path=ppt/slides/slide7.xml><?xml version="1.0" encoding="utf-8"?>
+<p:sld xmlns:a="http://schemas.openxmlformats.org/drawingml/2006/main" xmlns:r="http://schemas.openxmlformats.org/officeDocument/2006/relationships" xmlns:p="http://schemas.openxmlformats.org/presentationml/2006/main">
+  <p:cSld>
+    <p:spTree>
+      <p:nvGrpSpPr>
+        <p:cNvPr id="1" name=""/>
+        <p:cNvGrpSpPr/>
+        <p:nvPr/>
+      </p:nvGrpSpPr>
+      <p:grpSpPr>
+        <a:xfrm>
+          <a:off x="0" y="0"/>
+          <a:ext cx="0" cy="0"/>
+          <a:chOff x="0" y="0"/>
+          <a:chExt cx="0" cy="0"/>
+        </a:xfrm>
+      </p:grpSpPr>
+      <p:sp>
+        <p:nvSpPr>
+          <p:cNvPr id="2" name="Title 1"/>
+          <p:cNvSpPr>
+            <a:spLocks noGrp="1"/>
+          </p:cNvSpPr>
+          <p:nvPr>
+            <p:ph type="title"/>
+          </p:nvPr>
+        </p:nvSpPr>
+        <p:spPr/>
+        <p:txBody>
+          <a:bodyPr/>
+          <a:lstStyle/>
+          <a:p>
+            <a:r>
+              <a:rPr lang="en-GB" dirty="0" err="1"/>
+              <a:t>Contructor</a:t>
+            </a:r>
+            <a:r>
+              <a:rPr lang="en-GB" dirty="0"/>
+              <a:t>/Destructor</a:t>
+            </a:r>
+          </a:p>
+        </p:txBody>
+      </p:sp>
+      <p:sp>
+        <p:nvSpPr>
+          <p:cNvPr id="3" name="Content Placeholder 2"/>
+          <p:cNvSpPr>
+            <a:spLocks noGrp="1"/>
+          </p:cNvSpPr>
+          <p:nvPr>
+            <p:ph idx="1"/>
+          </p:nvPr>
+        </p:nvSpPr>
+        <p:spPr/>
+        <p:txBody>
+          <a:bodyPr/>
+          <a:lstStyle/>
+          <a:p>
+            <a:r>
+              <a:rPr lang="en-GB" dirty="0"/>
+              <a:t>Het </a:t>
+            </a:r>
+            <a:r>
+              <a:rPr lang="en-GB" dirty="0" err="1"/>
+              <a:t>opzetten</a:t>
+            </a:r>
+            <a:r>
+              <a:rPr lang="en-GB" dirty="0"/>
+              <a:t> van </a:t>
+            </a:r>
+            <a:r>
+              <a:rPr lang="en-GB" dirty="0" err="1"/>
+              <a:t>een</a:t>
+            </a:r>
+            <a:r>
+              <a:rPr lang="en-GB" dirty="0"/>
+              <a:t> object</a:t>
+            </a:r>
+          </a:p>
+          <a:p>
+            <a:r>
+              <a:rPr lang="en-GB" dirty="0"/>
+              <a:t>Het </a:t>
+            </a:r>
+            <a:r>
+              <a:rPr lang="en-GB" dirty="0" err="1"/>
+              <a:t>verwijderen</a:t>
+            </a:r>
+            <a:r>
+              <a:rPr lang="en-GB" dirty="0"/>
+              <a:t> van </a:t>
+            </a:r>
+            <a:r>
+              <a:rPr lang="en-GB" dirty="0" err="1"/>
+              <a:t>een</a:t>
+            </a:r>
+            <a:r>
+              <a:rPr lang="en-GB" dirty="0"/>
+              <a:t> object</a:t>
+            </a:r>
+          </a:p>
+        </p:txBody>
+      </p:sp>
+    </p:spTree>
+    <p:extLst>
+      <p:ext uri="{BB962C8B-B14F-4D97-AF65-F5344CB8AC3E}">
+        <p14:creationId xmlns:p14="http://schemas.microsoft.com/office/powerpoint/2010/main" val="136240204"/>
+      </p:ext>
+    </p:extLst>
+  </p:cSld>
+  <p:clrMapOvr>
+    <a:masterClrMapping/>
+  </p:clrMapOvr>
+</p:sld>
+</file>
+
+<file path=ppt/slides/slide8.xml><?xml version="1.0" encoding="utf-8"?>
+<p:sld xmlns:a="http://schemas.openxmlformats.org/drawingml/2006/main" xmlns:r="http://schemas.openxmlformats.org/officeDocument/2006/relationships" xmlns:p="http://schemas.openxmlformats.org/presentationml/2006/main">
+  <p:cSld>
+    <p:spTree>
+      <p:nvGrpSpPr>
+        <p:cNvPr id="1" name=""/>
+        <p:cNvGrpSpPr/>
+        <p:nvPr/>
+      </p:nvGrpSpPr>
+      <p:grpSpPr>
+        <a:xfrm>
+          <a:off x="0" y="0"/>
+          <a:ext cx="0" cy="0"/>
+          <a:chOff x="0" y="0"/>
+          <a:chExt cx="0" cy="0"/>
+        </a:xfrm>
+      </p:grpSpPr>
+      <p:sp>
+        <p:nvSpPr>
+          <p:cNvPr id="2" name="Title 1"/>
+          <p:cNvSpPr>
+            <a:spLocks noGrp="1"/>
+          </p:cNvSpPr>
+          <p:nvPr>
+            <p:ph type="title"/>
+          </p:nvPr>
+        </p:nvSpPr>
+        <p:spPr/>
+        <p:txBody>
+          <a:bodyPr/>
+          <a:lstStyle/>
+          <a:p>
+            <a:r>
+              <a:rPr lang="en-GB" dirty="0"/>
               <a:t>Inheritance</a:t>
             </a:r>
           </a:p>
@@ -3659,7 +4246,7 @@
           <a:p>
             <a:r>
               <a:rPr lang="en-GB" dirty="0"/>
-              <a:t>Base class</a:t>
+              <a:t>Base</a:t>
             </a:r>
           </a:p>
           <a:p>
@@ -3671,13 +4258,13 @@
           <a:p>
             <a:r>
               <a:rPr lang="en-GB" dirty="0"/>
+              <a:t>New</a:t>
+            </a:r>
+          </a:p>
+          <a:p>
+            <a:r>
+              <a:rPr lang="en-GB" dirty="0"/>
               <a:t>Virtual</a:t>
-            </a:r>
-          </a:p>
-          <a:p>
-            <a:r>
-              <a:rPr lang="en-GB" dirty="0"/>
-              <a:t>New</a:t>
             </a:r>
           </a:p>
         </p:txBody>
@@ -3692,258 +4279,99 @@
   <p:clrMapOvr>
     <a:masterClrMapping/>
   </p:clrMapOvr>
-  <p:timing>
-    <p:tnLst>
-      <p:par>
-        <p:cTn id="1" dur="indefinite" restart="never" nodeType="tmRoot">
-          <p:childTnLst>
-            <p:seq concurrent="1" nextAc="seek">
-              <p:cTn id="2" dur="indefinite" nodeType="mainSeq">
-                <p:childTnLst>
-                  <p:par>
-                    <p:cTn id="3" fill="hold">
-                      <p:stCondLst>
-                        <p:cond delay="indefinite"/>
-                      </p:stCondLst>
-                      <p:childTnLst>
-                        <p:par>
-                          <p:cTn id="4" fill="hold">
-                            <p:stCondLst>
-                              <p:cond delay="0"/>
-                            </p:stCondLst>
-                            <p:childTnLst>
-                              <p:par>
-                                <p:cTn id="5" presetID="1" presetClass="entr" presetSubtype="0" fill="hold" grpId="0" nodeType="clickEffect">
-                                  <p:stCondLst>
-                                    <p:cond delay="0"/>
-                                  </p:stCondLst>
-                                  <p:childTnLst>
-                                    <p:set>
-                                      <p:cBhvr>
-                                        <p:cTn id="6" dur="1" fill="hold">
-                                          <p:stCondLst>
-                                            <p:cond delay="0"/>
-                                          </p:stCondLst>
-                                        </p:cTn>
-                                        <p:tgtEl>
-                                          <p:spTgt spid="2"/>
-                                        </p:tgtEl>
-                                        <p:attrNameLst>
-                                          <p:attrName>style.visibility</p:attrName>
-                                        </p:attrNameLst>
-                                      </p:cBhvr>
-                                      <p:to>
-                                        <p:strVal val="visible"/>
-                                      </p:to>
-                                    </p:set>
-                                  </p:childTnLst>
-                                </p:cTn>
-                              </p:par>
-                            </p:childTnLst>
-                          </p:cTn>
-                        </p:par>
-                      </p:childTnLst>
-                    </p:cTn>
-                  </p:par>
-                  <p:par>
-                    <p:cTn id="7" fill="hold">
-                      <p:stCondLst>
-                        <p:cond delay="indefinite"/>
-                      </p:stCondLst>
-                      <p:childTnLst>
-                        <p:par>
-                          <p:cTn id="8" fill="hold">
-                            <p:stCondLst>
-                              <p:cond delay="0"/>
-                            </p:stCondLst>
-                            <p:childTnLst>
-                              <p:par>
-                                <p:cTn id="9" presetID="1" presetClass="entr" presetSubtype="0" fill="hold" grpId="0" nodeType="clickEffect">
-                                  <p:stCondLst>
-                                    <p:cond delay="0"/>
-                                  </p:stCondLst>
-                                  <p:childTnLst>
-                                    <p:set>
-                                      <p:cBhvr>
-                                        <p:cTn id="10" dur="1" fill="hold">
-                                          <p:stCondLst>
-                                            <p:cond delay="0"/>
-                                          </p:stCondLst>
-                                        </p:cTn>
-                                        <p:tgtEl>
-                                          <p:spTgt spid="3">
-                                            <p:txEl>
-                                              <p:pRg st="0" end="0"/>
-                                            </p:txEl>
-                                          </p:spTgt>
-                                        </p:tgtEl>
-                                        <p:attrNameLst>
-                                          <p:attrName>style.visibility</p:attrName>
-                                        </p:attrNameLst>
-                                      </p:cBhvr>
-                                      <p:to>
-                                        <p:strVal val="visible"/>
-                                      </p:to>
-                                    </p:set>
-                                  </p:childTnLst>
-                                </p:cTn>
-                              </p:par>
-                              <p:par>
-                                <p:cTn id="11" presetID="1" presetClass="entr" presetSubtype="0" fill="hold" grpId="0" nodeType="withEffect">
-                                  <p:stCondLst>
-                                    <p:cond delay="0"/>
-                                  </p:stCondLst>
-                                  <p:childTnLst>
-                                    <p:set>
-                                      <p:cBhvr>
-                                        <p:cTn id="12" dur="1" fill="hold">
-                                          <p:stCondLst>
-                                            <p:cond delay="0"/>
-                                          </p:stCondLst>
-                                        </p:cTn>
-                                        <p:tgtEl>
-                                          <p:spTgt spid="3">
-                                            <p:txEl>
-                                              <p:pRg st="1" end="1"/>
-                                            </p:txEl>
-                                          </p:spTgt>
-                                        </p:tgtEl>
-                                        <p:attrNameLst>
-                                          <p:attrName>style.visibility</p:attrName>
-                                        </p:attrNameLst>
-                                      </p:cBhvr>
-                                      <p:to>
-                                        <p:strVal val="visible"/>
-                                      </p:to>
-                                    </p:set>
-                                  </p:childTnLst>
-                                </p:cTn>
-                              </p:par>
-                              <p:par>
-                                <p:cTn id="13" presetID="1" presetClass="entr" presetSubtype="0" fill="hold" grpId="0" nodeType="withEffect">
-                                  <p:stCondLst>
-                                    <p:cond delay="0"/>
-                                  </p:stCondLst>
-                                  <p:childTnLst>
-                                    <p:set>
-                                      <p:cBhvr>
-                                        <p:cTn id="14" dur="1" fill="hold">
-                                          <p:stCondLst>
-                                            <p:cond delay="0"/>
-                                          </p:stCondLst>
-                                        </p:cTn>
-                                        <p:tgtEl>
-                                          <p:spTgt spid="3">
-                                            <p:txEl>
-                                              <p:pRg st="2" end="2"/>
-                                            </p:txEl>
-                                          </p:spTgt>
-                                        </p:tgtEl>
-                                        <p:attrNameLst>
-                                          <p:attrName>style.visibility</p:attrName>
-                                        </p:attrNameLst>
-                                      </p:cBhvr>
-                                      <p:to>
-                                        <p:strVal val="visible"/>
-                                      </p:to>
-                                    </p:set>
-                                  </p:childTnLst>
-                                </p:cTn>
-                              </p:par>
-                              <p:par>
-                                <p:cTn id="15" presetID="1" presetClass="entr" presetSubtype="0" fill="hold" grpId="0" nodeType="withEffect">
-                                  <p:stCondLst>
-                                    <p:cond delay="0"/>
-                                  </p:stCondLst>
-                                  <p:childTnLst>
-                                    <p:set>
-                                      <p:cBhvr>
-                                        <p:cTn id="16" dur="1" fill="hold">
-                                          <p:stCondLst>
-                                            <p:cond delay="0"/>
-                                          </p:stCondLst>
-                                        </p:cTn>
-                                        <p:tgtEl>
-                                          <p:spTgt spid="3">
-                                            <p:txEl>
-                                              <p:pRg st="3" end="3"/>
-                                            </p:txEl>
-                                          </p:spTgt>
-                                        </p:tgtEl>
-                                        <p:attrNameLst>
-                                          <p:attrName>style.visibility</p:attrName>
-                                        </p:attrNameLst>
-                                      </p:cBhvr>
-                                      <p:to>
-                                        <p:strVal val="visible"/>
-                                      </p:to>
-                                    </p:set>
-                                  </p:childTnLst>
-                                </p:cTn>
-                              </p:par>
-                              <p:par>
-                                <p:cTn id="17" presetID="1" presetClass="entr" presetSubtype="0" fill="hold" grpId="0" nodeType="withEffect">
-                                  <p:stCondLst>
-                                    <p:cond delay="0"/>
-                                  </p:stCondLst>
-                                  <p:childTnLst>
-                                    <p:set>
-                                      <p:cBhvr>
-                                        <p:cTn id="18" dur="1" fill="hold">
-                                          <p:stCondLst>
-                                            <p:cond delay="0"/>
-                                          </p:stCondLst>
-                                        </p:cTn>
-                                        <p:tgtEl>
-                                          <p:spTgt spid="3">
-                                            <p:txEl>
-                                              <p:pRg st="4" end="4"/>
-                                            </p:txEl>
-                                          </p:spTgt>
-                                        </p:tgtEl>
-                                        <p:attrNameLst>
-                                          <p:attrName>style.visibility</p:attrName>
-                                        </p:attrNameLst>
-                                      </p:cBhvr>
-                                      <p:to>
-                                        <p:strVal val="visible"/>
-                                      </p:to>
-                                    </p:set>
-                                  </p:childTnLst>
-                                </p:cTn>
-                              </p:par>
-                            </p:childTnLst>
-                          </p:cTn>
-                        </p:par>
-                      </p:childTnLst>
-                    </p:cTn>
-                  </p:par>
-                </p:childTnLst>
-              </p:cTn>
-              <p:prevCondLst>
-                <p:cond evt="onPrev" delay="0">
-                  <p:tgtEl>
-                    <p:sldTgt/>
-                  </p:tgtEl>
-                </p:cond>
-              </p:prevCondLst>
-              <p:nextCondLst>
-                <p:cond evt="onNext" delay="0">
-                  <p:tgtEl>
-                    <p:sldTgt/>
-                  </p:tgtEl>
-                </p:cond>
-              </p:nextCondLst>
-            </p:seq>
-          </p:childTnLst>
-        </p:cTn>
-      </p:par>
-    </p:tnLst>
-    <p:bldLst>
-      <p:bldP spid="2" grpId="0"/>
-      <p:bldP spid="3" grpId="0" build="allAtOnce"/>
-    </p:bldLst>
-  </p:timing>
+</p:sld>
+</file>
+
+<file path=ppt/slides/slide9.xml><?xml version="1.0" encoding="utf-8"?>
+<p:sld xmlns:a="http://schemas.openxmlformats.org/drawingml/2006/main" xmlns:r="http://schemas.openxmlformats.org/officeDocument/2006/relationships" xmlns:p="http://schemas.openxmlformats.org/presentationml/2006/main">
+  <p:cSld>
+    <p:spTree>
+      <p:nvGrpSpPr>
+        <p:cNvPr id="1" name=""/>
+        <p:cNvGrpSpPr/>
+        <p:nvPr/>
+      </p:nvGrpSpPr>
+      <p:grpSpPr>
+        <a:xfrm>
+          <a:off x="0" y="0"/>
+          <a:ext cx="0" cy="0"/>
+          <a:chOff x="0" y="0"/>
+          <a:chExt cx="0" cy="0"/>
+        </a:xfrm>
+      </p:grpSpPr>
+      <p:sp>
+        <p:nvSpPr>
+          <p:cNvPr id="2" name="Titel 1"/>
+          <p:cNvSpPr>
+            <a:spLocks noGrp="1"/>
+          </p:cNvSpPr>
+          <p:nvPr>
+            <p:ph type="title"/>
+          </p:nvPr>
+        </p:nvSpPr>
+        <p:spPr/>
+        <p:txBody>
+          <a:bodyPr/>
+          <a:lstStyle/>
+          <a:p>
+            <a:r>
+              <a:rPr lang="nl-NL" dirty="0" err="1"/>
+              <a:t>Exception</a:t>
+            </a:r>
+            <a:r>
+              <a:rPr lang="nl-NL" dirty="0"/>
+              <a:t> handling</a:t>
+            </a:r>
+            <a:endParaRPr lang="nl-NL" dirty="0"/>
+          </a:p>
+        </p:txBody>
+      </p:sp>
+      <p:sp>
+        <p:nvSpPr>
+          <p:cNvPr id="3" name="Tijdelijke aanduiding voor inhoud 2"/>
+          <p:cNvSpPr>
+            <a:spLocks noGrp="1"/>
+          </p:cNvSpPr>
+          <p:nvPr>
+            <p:ph idx="1"/>
+          </p:nvPr>
+        </p:nvSpPr>
+        <p:spPr/>
+        <p:txBody>
+          <a:bodyPr/>
+          <a:lstStyle/>
+          <a:p>
+            <a:r>
+              <a:rPr lang="nl-NL" dirty="0" err="1"/>
+              <a:t>Try</a:t>
+            </a:r>
+            <a:endParaRPr lang="nl-NL" dirty="0"/>
+          </a:p>
+          <a:p>
+            <a:r>
+              <a:rPr lang="nl-NL" dirty="0"/>
+              <a:t>Catch</a:t>
+            </a:r>
+          </a:p>
+          <a:p>
+            <a:r>
+              <a:rPr lang="nl-NL" dirty="0" err="1"/>
+              <a:t>Finally</a:t>
+            </a:r>
+            <a:endParaRPr lang="nl-NL" dirty="0"/>
+          </a:p>
+        </p:txBody>
+      </p:sp>
+    </p:spTree>
+    <p:extLst>
+      <p:ext uri="{BB962C8B-B14F-4D97-AF65-F5344CB8AC3E}">
+        <p14:creationId xmlns:p14="http://schemas.microsoft.com/office/powerpoint/2010/main" val="192290273"/>
+      </p:ext>
+    </p:extLst>
+  </p:cSld>
+  <p:clrMapOvr>
+    <a:masterClrMapping/>
+  </p:clrMapOvr>
 </p:sld>
 </file>
 

</xml_diff>